<commit_message>
Updated FCC OKC PowerPoint
</commit_message>
<xml_diff>
--- a/2018-01-21 FreeCodeCamp OKC.pptx
+++ b/2018-01-21 FreeCodeCamp OKC.pptx
@@ -5,7 +5,7 @@
     <p:sldMasterId id="2147483659" r:id="rId1"/>
   </p:sldMasterIdLst>
   <p:notesMasterIdLst>
-    <p:notesMasterId r:id="rId15"/>
+    <p:notesMasterId r:id="rId16"/>
   </p:notesMasterIdLst>
   <p:sldIdLst>
     <p:sldId id="256" r:id="rId2"/>
@@ -17,27 +17,28 @@
     <p:sldId id="262" r:id="rId8"/>
     <p:sldId id="263" r:id="rId9"/>
     <p:sldId id="264" r:id="rId10"/>
-    <p:sldId id="265" r:id="rId11"/>
-    <p:sldId id="266" r:id="rId12"/>
-    <p:sldId id="267" r:id="rId13"/>
-    <p:sldId id="268" r:id="rId14"/>
+    <p:sldId id="269" r:id="rId11"/>
+    <p:sldId id="265" r:id="rId12"/>
+    <p:sldId id="266" r:id="rId13"/>
+    <p:sldId id="267" r:id="rId14"/>
+    <p:sldId id="268" r:id="rId15"/>
   </p:sldIdLst>
   <p:sldSz cx="9144000" cy="5143500" type="screen16x9"/>
   <p:notesSz cx="6858000" cy="9144000"/>
   <p:embeddedFontLst>
     <p:embeddedFont>
       <p:font typeface="Raleway" panose="020B0604020202020204" charset="0"/>
-      <p:regular r:id="rId16"/>
-      <p:bold r:id="rId17"/>
-      <p:italic r:id="rId18"/>
-      <p:boldItalic r:id="rId19"/>
+      <p:regular r:id="rId17"/>
+      <p:bold r:id="rId18"/>
+      <p:italic r:id="rId19"/>
+      <p:boldItalic r:id="rId20"/>
     </p:embeddedFont>
     <p:embeddedFont>
       <p:font typeface="Source Sans Pro" panose="020B0604020202020204" charset="0"/>
-      <p:regular r:id="rId20"/>
-      <p:bold r:id="rId21"/>
-      <p:italic r:id="rId22"/>
-      <p:boldItalic r:id="rId23"/>
+      <p:regular r:id="rId21"/>
+      <p:bold r:id="rId22"/>
+      <p:italic r:id="rId23"/>
+      <p:boldItalic r:id="rId24"/>
     </p:embeddedFont>
   </p:embeddedFontLst>
   <p:defaultTextStyle>
@@ -661,6 +662,110 @@
   <p:cSld>
     <p:spTree>
       <p:nvGrpSpPr>
+        <p:cNvPr id="1" name="Shape 115"/>
+        <p:cNvGrpSpPr/>
+        <p:nvPr/>
+      </p:nvGrpSpPr>
+      <p:grpSpPr>
+        <a:xfrm>
+          <a:off x="0" y="0"/>
+          <a:ext cx="0" cy="0"/>
+          <a:chOff x="0" y="0"/>
+          <a:chExt cx="0" cy="0"/>
+        </a:xfrm>
+      </p:grpSpPr>
+      <p:sp>
+        <p:nvSpPr>
+          <p:cNvPr id="116" name="Shape 116"/>
+          <p:cNvSpPr>
+            <a:spLocks noGrp="1" noRot="1" noChangeAspect="1"/>
+          </p:cNvSpPr>
+          <p:nvPr>
+            <p:ph type="sldImg" idx="2"/>
+          </p:nvPr>
+        </p:nvSpPr>
+        <p:spPr>
+          <a:xfrm>
+            <a:off x="381000" y="685800"/>
+            <a:ext cx="6096000" cy="3429000"/>
+          </a:xfrm>
+          <a:custGeom>
+            <a:avLst/>
+            <a:gdLst/>
+            <a:ahLst/>
+            <a:cxnLst/>
+            <a:rect l="0" t="0" r="0" b="0"/>
+            <a:pathLst>
+              <a:path w="120000" h="120000" extrusionOk="0">
+                <a:moveTo>
+                  <a:pt x="0" y="0"/>
+                </a:moveTo>
+                <a:lnTo>
+                  <a:pt x="120000" y="0"/>
+                </a:lnTo>
+                <a:lnTo>
+                  <a:pt x="120000" y="120000"/>
+                </a:lnTo>
+                <a:lnTo>
+                  <a:pt x="0" y="120000"/>
+                </a:lnTo>
+                <a:close/>
+              </a:path>
+            </a:pathLst>
+          </a:custGeom>
+        </p:spPr>
+      </p:sp>
+      <p:sp>
+        <p:nvSpPr>
+          <p:cNvPr id="117" name="Shape 117"/>
+          <p:cNvSpPr txBox="1">
+            <a:spLocks noGrp="1"/>
+          </p:cNvSpPr>
+          <p:nvPr>
+            <p:ph type="body" idx="1"/>
+          </p:nvPr>
+        </p:nvSpPr>
+        <p:spPr>
+          <a:xfrm>
+            <a:off x="685800" y="4343400"/>
+            <a:ext cx="5486400" cy="4114800"/>
+          </a:xfrm>
+          <a:prstGeom prst="rect">
+            <a:avLst/>
+          </a:prstGeom>
+        </p:spPr>
+        <p:txBody>
+          <a:bodyPr spcFirstLastPara="1" wrap="square" lIns="91425" tIns="91425" rIns="91425" bIns="91425" anchor="t" anchorCtr="0">
+            <a:noAutofit/>
+          </a:bodyPr>
+          <a:lstStyle/>
+          <a:p>
+            <a:pPr marL="0" lvl="0" indent="0" rtl="0">
+              <a:spcBef>
+                <a:spcPts val="0"/>
+              </a:spcBef>
+              <a:spcAft>
+                <a:spcPts val="0"/>
+              </a:spcAft>
+              <a:buNone/>
+            </a:pPr>
+            <a:endParaRPr/>
+          </a:p>
+        </p:txBody>
+      </p:sp>
+    </p:spTree>
+  </p:cSld>
+  <p:clrMapOvr>
+    <a:masterClrMapping/>
+  </p:clrMapOvr>
+</p:notes>
+</file>
+
+<file path=ppt/notesSlides/notesSlide11.xml><?xml version="1.0" encoding="utf-8"?>
+<p:notes xmlns:a="http://schemas.openxmlformats.org/drawingml/2006/main" xmlns:r="http://schemas.openxmlformats.org/officeDocument/2006/relationships" xmlns:p="http://schemas.openxmlformats.org/presentationml/2006/main" showMasterSp="0" showMasterPhAnim="0">
+  <p:cSld>
+    <p:spTree>
+      <p:nvGrpSpPr>
         <p:cNvPr id="1" name="Shape 109"/>
         <p:cNvGrpSpPr/>
         <p:nvPr/>
@@ -760,7 +865,7 @@
 </p:notes>
 </file>
 
-<file path=ppt/notesSlides/notesSlide11.xml><?xml version="1.0" encoding="utf-8"?>
+<file path=ppt/notesSlides/notesSlide12.xml><?xml version="1.0" encoding="utf-8"?>
 <p:notes xmlns:a="http://schemas.openxmlformats.org/drawingml/2006/main" xmlns:r="http://schemas.openxmlformats.org/officeDocument/2006/relationships" xmlns:p="http://schemas.openxmlformats.org/presentationml/2006/main" showMasterSp="0" showMasterPhAnim="0">
   <p:cSld>
     <p:spTree>
@@ -864,7 +969,7 @@
 </p:notes>
 </file>
 
-<file path=ppt/notesSlides/notesSlide12.xml><?xml version="1.0" encoding="utf-8"?>
+<file path=ppt/notesSlides/notesSlide13.xml><?xml version="1.0" encoding="utf-8"?>
 <p:notes xmlns:a="http://schemas.openxmlformats.org/drawingml/2006/main" xmlns:r="http://schemas.openxmlformats.org/officeDocument/2006/relationships" xmlns:p="http://schemas.openxmlformats.org/presentationml/2006/main" showMasterSp="0" showMasterPhAnim="0">
   <p:cSld>
     <p:spTree>
@@ -968,7 +1073,7 @@
 </p:notes>
 </file>
 
-<file path=ppt/notesSlides/notesSlide13.xml><?xml version="1.0" encoding="utf-8"?>
+<file path=ppt/notesSlides/notesSlide14.xml><?xml version="1.0" encoding="utf-8"?>
 <p:notes xmlns:a="http://schemas.openxmlformats.org/drawingml/2006/main" xmlns:r="http://schemas.openxmlformats.org/officeDocument/2006/relationships" xmlns:p="http://schemas.openxmlformats.org/presentationml/2006/main" showMasterSp="0" showMasterPhAnim="0">
   <p:cSld>
     <p:spTree>
@@ -2297,11 +2402,11 @@
   <p:clrMapOvr>
     <a:masterClrMapping/>
   </p:clrMapOvr>
-  <mc:AlternateContent xmlns:mc="http://schemas.openxmlformats.org/markup-compatibility/2006">
-    <mc:Choice xmlns:p14="http://schemas.microsoft.com/office/powerpoint/2010/main" Requires="p14">
+  <mc:AlternateContent xmlns:mc="http://schemas.openxmlformats.org/markup-compatibility/2006" xmlns:p14="http://schemas.microsoft.com/office/powerpoint/2010/main">
+    <mc:Choice Requires="p14">
       <p:transition spd="slow" p14:dur="2000" advTm="10000"/>
     </mc:Choice>
-    <mc:Fallback>
+    <mc:Fallback xmlns="">
       <p:transition spd="slow" advTm="10000"/>
     </mc:Fallback>
   </mc:AlternateContent>
@@ -2791,11 +2896,11 @@
   <p:clrMapOvr>
     <a:masterClrMapping/>
   </p:clrMapOvr>
-  <mc:AlternateContent xmlns:mc="http://schemas.openxmlformats.org/markup-compatibility/2006">
-    <mc:Choice xmlns:p14="http://schemas.microsoft.com/office/powerpoint/2010/main" Requires="p14">
+  <mc:AlternateContent xmlns:mc="http://schemas.openxmlformats.org/markup-compatibility/2006" xmlns:p14="http://schemas.microsoft.com/office/powerpoint/2010/main">
+    <mc:Choice Requires="p14">
       <p:transition spd="slow" p14:dur="2000" advTm="10000"/>
     </mc:Choice>
-    <mc:Fallback>
+    <mc:Fallback xmlns="">
       <p:transition spd="slow" advTm="10000"/>
     </mc:Fallback>
   </mc:AlternateContent>
@@ -2866,11 +2971,11 @@
   <p:clrMapOvr>
     <a:masterClrMapping/>
   </p:clrMapOvr>
-  <mc:AlternateContent xmlns:mc="http://schemas.openxmlformats.org/markup-compatibility/2006">
-    <mc:Choice xmlns:p14="http://schemas.microsoft.com/office/powerpoint/2010/main" Requires="p14">
+  <mc:AlternateContent xmlns:mc="http://schemas.openxmlformats.org/markup-compatibility/2006" xmlns:p14="http://schemas.microsoft.com/office/powerpoint/2010/main">
+    <mc:Choice Requires="p14">
       <p:transition spd="slow" p14:dur="2000" advTm="10000"/>
     </mc:Choice>
-    <mc:Fallback>
+    <mc:Fallback xmlns="">
       <p:transition spd="slow" advTm="10000"/>
     </mc:Fallback>
   </mc:AlternateContent>
@@ -3116,11 +3221,11 @@
   <p:clrMapOvr>
     <a:masterClrMapping/>
   </p:clrMapOvr>
-  <mc:AlternateContent xmlns:mc="http://schemas.openxmlformats.org/markup-compatibility/2006">
-    <mc:Choice xmlns:p14="http://schemas.microsoft.com/office/powerpoint/2010/main" Requires="p14">
+  <mc:AlternateContent xmlns:mc="http://schemas.openxmlformats.org/markup-compatibility/2006" xmlns:p14="http://schemas.microsoft.com/office/powerpoint/2010/main">
+    <mc:Choice Requires="p14">
       <p:transition spd="slow" p14:dur="2000" advTm="10000"/>
     </mc:Choice>
-    <mc:Fallback>
+    <mc:Fallback xmlns="">
       <p:transition spd="slow" advTm="10000"/>
     </mc:Fallback>
   </mc:AlternateContent>
@@ -3445,11 +3550,11 @@
   <p:clrMapOvr>
     <a:masterClrMapping/>
   </p:clrMapOvr>
-  <mc:AlternateContent xmlns:mc="http://schemas.openxmlformats.org/markup-compatibility/2006">
-    <mc:Choice xmlns:p14="http://schemas.microsoft.com/office/powerpoint/2010/main" Requires="p14">
+  <mc:AlternateContent xmlns:mc="http://schemas.openxmlformats.org/markup-compatibility/2006" xmlns:p14="http://schemas.microsoft.com/office/powerpoint/2010/main">
+    <mc:Choice Requires="p14">
       <p:transition spd="slow" p14:dur="2000" advTm="10000"/>
     </mc:Choice>
-    <mc:Fallback>
+    <mc:Fallback xmlns="">
       <p:transition spd="slow" advTm="10000"/>
     </mc:Fallback>
   </mc:AlternateContent>
@@ -3901,11 +4006,11 @@
   <p:clrMapOvr>
     <a:masterClrMapping/>
   </p:clrMapOvr>
-  <mc:AlternateContent xmlns:mc="http://schemas.openxmlformats.org/markup-compatibility/2006">
-    <mc:Choice xmlns:p14="http://schemas.microsoft.com/office/powerpoint/2010/main" Requires="p14">
+  <mc:AlternateContent xmlns:mc="http://schemas.openxmlformats.org/markup-compatibility/2006" xmlns:p14="http://schemas.microsoft.com/office/powerpoint/2010/main">
+    <mc:Choice Requires="p14">
       <p:transition spd="slow" p14:dur="2000" advTm="10000"/>
     </mc:Choice>
-    <mc:Fallback>
+    <mc:Fallback xmlns="">
       <p:transition spd="slow" advTm="10000"/>
     </mc:Fallback>
   </mc:AlternateContent>
@@ -4103,11 +4208,11 @@
   <p:clrMapOvr>
     <a:masterClrMapping/>
   </p:clrMapOvr>
-  <mc:AlternateContent xmlns:mc="http://schemas.openxmlformats.org/markup-compatibility/2006">
-    <mc:Choice xmlns:p14="http://schemas.microsoft.com/office/powerpoint/2010/main" Requires="p14">
+  <mc:AlternateContent xmlns:mc="http://schemas.openxmlformats.org/markup-compatibility/2006" xmlns:p14="http://schemas.microsoft.com/office/powerpoint/2010/main">
+    <mc:Choice Requires="p14">
       <p:transition spd="slow" p14:dur="2000" advTm="10000"/>
     </mc:Choice>
-    <mc:Fallback>
+    <mc:Fallback xmlns="">
       <p:transition spd="slow" advTm="10000"/>
     </mc:Fallback>
   </mc:AlternateContent>
@@ -4432,11 +4537,11 @@
   <p:clrMapOvr>
     <a:masterClrMapping/>
   </p:clrMapOvr>
-  <mc:AlternateContent xmlns:mc="http://schemas.openxmlformats.org/markup-compatibility/2006">
-    <mc:Choice xmlns:p14="http://schemas.microsoft.com/office/powerpoint/2010/main" Requires="p14">
+  <mc:AlternateContent xmlns:mc="http://schemas.openxmlformats.org/markup-compatibility/2006" xmlns:p14="http://schemas.microsoft.com/office/powerpoint/2010/main">
+    <mc:Choice Requires="p14">
       <p:transition spd="slow" p14:dur="2000" advTm="10000"/>
     </mc:Choice>
-    <mc:Fallback>
+    <mc:Fallback xmlns="">
       <p:transition spd="slow" advTm="10000"/>
     </mc:Fallback>
   </mc:AlternateContent>
@@ -4713,11 +4818,11 @@
   <p:clrMapOvr>
     <a:masterClrMapping/>
   </p:clrMapOvr>
-  <mc:AlternateContent xmlns:mc="http://schemas.openxmlformats.org/markup-compatibility/2006">
-    <mc:Choice xmlns:p14="http://schemas.microsoft.com/office/powerpoint/2010/main" Requires="p14">
+  <mc:AlternateContent xmlns:mc="http://schemas.openxmlformats.org/markup-compatibility/2006" xmlns:p14="http://schemas.microsoft.com/office/powerpoint/2010/main">
+    <mc:Choice Requires="p14">
       <p:transition spd="slow" p14:dur="2000" advTm="10000"/>
     </mc:Choice>
-    <mc:Fallback>
+    <mc:Fallback xmlns="">
       <p:transition spd="slow" advTm="10000"/>
     </mc:Fallback>
   </mc:AlternateContent>
@@ -5333,11 +5438,11 @@
   <p:clrMapOvr>
     <a:masterClrMapping/>
   </p:clrMapOvr>
-  <mc:AlternateContent xmlns:mc="http://schemas.openxmlformats.org/markup-compatibility/2006">
-    <mc:Choice xmlns:p14="http://schemas.microsoft.com/office/powerpoint/2010/main" Requires="p14">
+  <mc:AlternateContent xmlns:mc="http://schemas.openxmlformats.org/markup-compatibility/2006" xmlns:p14="http://schemas.microsoft.com/office/powerpoint/2010/main">
+    <mc:Choice Requires="p14">
       <p:transition spd="slow" p14:dur="2000" advTm="10000"/>
     </mc:Choice>
-    <mc:Fallback>
+    <mc:Fallback xmlns="">
       <p:transition spd="slow" advTm="10000"/>
     </mc:Fallback>
   </mc:AlternateContent>
@@ -5450,11 +5555,11 @@
   <p:clrMapOvr>
     <a:masterClrMapping/>
   </p:clrMapOvr>
-  <mc:AlternateContent xmlns:mc="http://schemas.openxmlformats.org/markup-compatibility/2006">
-    <mc:Choice xmlns:p14="http://schemas.microsoft.com/office/powerpoint/2010/main" Requires="p14">
+  <mc:AlternateContent xmlns:mc="http://schemas.openxmlformats.org/markup-compatibility/2006" xmlns:p14="http://schemas.microsoft.com/office/powerpoint/2010/main">
+    <mc:Choice Requires="p14">
       <p:transition spd="slow" p14:dur="2000" advTm="10000"/>
     </mc:Choice>
-    <mc:Fallback>
+    <mc:Fallback xmlns="">
       <p:transition spd="slow" advTm="10000"/>
     </mc:Fallback>
   </mc:AlternateContent>
@@ -6069,11 +6174,11 @@
     <p:sldLayoutId id="2147483657" r:id="rId10"/>
     <p:sldLayoutId id="2147483658" r:id="rId11"/>
   </p:sldLayoutIdLst>
-  <mc:AlternateContent xmlns:mc="http://schemas.openxmlformats.org/markup-compatibility/2006">
-    <mc:Choice xmlns:p14="http://schemas.microsoft.com/office/powerpoint/2010/main" Requires="p14">
+  <mc:AlternateContent xmlns:mc="http://schemas.openxmlformats.org/markup-compatibility/2006" xmlns:p14="http://schemas.microsoft.com/office/powerpoint/2010/main">
+    <mc:Choice Requires="p14">
       <p:transition spd="slow" p14:dur="2000" advTm="10000"/>
     </mc:Choice>
-    <mc:Fallback>
+    <mc:Fallback xmlns="">
       <p:transition spd="slow" advTm="10000"/>
     </mc:Fallback>
   </mc:AlternateContent>
@@ -6639,7 +6744,7 @@
               <a:buNone/>
             </a:pPr>
             <a:r>
-              <a:rPr lang="en" sz="4800" b="1">
+              <a:rPr lang="en" sz="4400" b="1" dirty="0">
                 <a:solidFill>
                   <a:srgbClr val="FFFFFF"/>
                 </a:solidFill>
@@ -6650,7 +6755,7 @@
               </a:rPr>
               <a:t>Password: </a:t>
             </a:r>
-            <a:endParaRPr sz="4800" b="1">
+            <a:endParaRPr sz="4400" b="1" dirty="0">
               <a:solidFill>
                 <a:srgbClr val="FFFFFF"/>
               </a:solidFill>
@@ -6679,7 +6784,7 @@
               <a:buNone/>
             </a:pPr>
             <a:r>
-              <a:rPr lang="en" sz="4800" b="1">
+              <a:rPr lang="en" sz="4400" b="1" dirty="0">
                 <a:solidFill>
                   <a:srgbClr val="FFFFFF"/>
                 </a:solidFill>
@@ -6690,7 +6795,7 @@
               </a:rPr>
               <a:t>Techlahoma</a:t>
             </a:r>
-            <a:endParaRPr>
+            <a:endParaRPr sz="1600" dirty="0">
               <a:solidFill>
                 <a:srgbClr val="FFFFFF"/>
               </a:solidFill>
@@ -6703,11 +6808,11 @@
   <p:clrMapOvr>
     <a:masterClrMapping/>
   </p:clrMapOvr>
-  <mc:AlternateContent xmlns:mc="http://schemas.openxmlformats.org/markup-compatibility/2006">
-    <mc:Choice xmlns:p14="http://schemas.microsoft.com/office/powerpoint/2010/main" Requires="p14">
+  <mc:AlternateContent xmlns:mc="http://schemas.openxmlformats.org/markup-compatibility/2006" xmlns:p14="http://schemas.microsoft.com/office/powerpoint/2010/main">
+    <mc:Choice Requires="p14">
       <p:transition spd="slow" p14:dur="2000" advTm="10000"/>
     </mc:Choice>
-    <mc:Fallback>
+    <mc:Fallback xmlns="">
       <p:transition spd="slow" advTm="10000"/>
     </mc:Fallback>
   </mc:AlternateContent>
@@ -6715,6 +6820,164 @@
 </file>
 
 <file path=ppt/slides/slide10.xml><?xml version="1.0" encoding="utf-8"?>
+<p:sld xmlns:a="http://schemas.openxmlformats.org/drawingml/2006/main" xmlns:r="http://schemas.openxmlformats.org/officeDocument/2006/relationships" xmlns:p="http://schemas.openxmlformats.org/presentationml/2006/main">
+  <p:cSld>
+    <p:spTree>
+      <p:nvGrpSpPr>
+        <p:cNvPr id="1" name="Shape 118"/>
+        <p:cNvGrpSpPr/>
+        <p:nvPr/>
+      </p:nvGrpSpPr>
+      <p:grpSpPr>
+        <a:xfrm>
+          <a:off x="0" y="0"/>
+          <a:ext cx="0" cy="0"/>
+          <a:chOff x="0" y="0"/>
+          <a:chExt cx="0" cy="0"/>
+        </a:xfrm>
+      </p:grpSpPr>
+      <p:sp>
+        <p:nvSpPr>
+          <p:cNvPr id="119" name="Shape 119"/>
+          <p:cNvSpPr txBox="1">
+            <a:spLocks noGrp="1"/>
+          </p:cNvSpPr>
+          <p:nvPr>
+            <p:ph type="body" idx="1"/>
+          </p:nvPr>
+        </p:nvSpPr>
+        <p:spPr>
+          <a:xfrm>
+            <a:off x="311700" y="1152475"/>
+            <a:ext cx="8520600" cy="3416400"/>
+          </a:xfrm>
+          <a:prstGeom prst="rect">
+            <a:avLst/>
+          </a:prstGeom>
+        </p:spPr>
+        <p:txBody>
+          <a:bodyPr spcFirstLastPara="1" wrap="square" lIns="91425" tIns="91425" rIns="91425" bIns="91425" anchor="t" anchorCtr="0">
+            <a:noAutofit/>
+          </a:bodyPr>
+          <a:lstStyle/>
+          <a:p>
+            <a:pPr marL="0" indent="0">
+              <a:spcBef>
+                <a:spcPts val="1600"/>
+              </a:spcBef>
+              <a:buNone/>
+            </a:pPr>
+            <a:r>
+              <a:rPr lang="en-US" dirty="0"/>
+              <a:t>Next meetup will be scheduled </a:t>
+            </a:r>
+            <a:r>
+              <a:rPr lang="en-US" dirty="0"/>
+              <a:t>soon!</a:t>
+            </a:r>
+            <a:endParaRPr lang="en-US" dirty="0"/>
+          </a:p>
+          <a:p>
+            <a:pPr marL="0" indent="0">
+              <a:spcBef>
+                <a:spcPts val="1600"/>
+              </a:spcBef>
+              <a:buNone/>
+            </a:pPr>
+            <a:r>
+              <a:rPr lang="en-US" dirty="0"/>
+              <a:t>Contact Kimberly Collins for </a:t>
+            </a:r>
+            <a:r>
+              <a:rPr lang="en-US" dirty="0" smtClean="0"/>
+              <a:t>details</a:t>
+            </a:r>
+          </a:p>
+          <a:p>
+            <a:pPr marL="0" indent="0">
+              <a:spcBef>
+                <a:spcPts val="1600"/>
+              </a:spcBef>
+              <a:buNone/>
+            </a:pPr>
+            <a:r>
+              <a:rPr lang="en-US" u="sng" dirty="0" smtClean="0">
+                <a:hlinkClick r:id="rId3"/>
+              </a:rPr>
+              <a:t>www.meetup.com/okccoffeeandcode</a:t>
+            </a:r>
+            <a:r>
+              <a:rPr lang="en-US" dirty="0" smtClean="0"/>
+              <a:t> </a:t>
+            </a:r>
+            <a:endParaRPr sz="4000" dirty="0"/>
+          </a:p>
+        </p:txBody>
+      </p:sp>
+      <p:sp>
+        <p:nvSpPr>
+          <p:cNvPr id="120" name="Shape 120"/>
+          <p:cNvSpPr txBox="1">
+            <a:spLocks noGrp="1"/>
+          </p:cNvSpPr>
+          <p:nvPr>
+            <p:ph type="title"/>
+          </p:nvPr>
+        </p:nvSpPr>
+        <p:spPr>
+          <a:xfrm>
+            <a:off x="311700" y="253750"/>
+            <a:ext cx="8520600" cy="814500"/>
+          </a:xfrm>
+          <a:prstGeom prst="rect">
+            <a:avLst/>
+          </a:prstGeom>
+        </p:spPr>
+        <p:txBody>
+          <a:bodyPr spcFirstLastPara="1" wrap="square" lIns="91425" tIns="91425" rIns="91425" bIns="91425" anchor="t" anchorCtr="0">
+            <a:noAutofit/>
+          </a:bodyPr>
+          <a:lstStyle/>
+          <a:p>
+            <a:pPr marL="0" lvl="0" indent="0" rtl="0">
+              <a:spcBef>
+                <a:spcPts val="0"/>
+              </a:spcBef>
+              <a:spcAft>
+                <a:spcPts val="0"/>
+              </a:spcAft>
+              <a:buNone/>
+            </a:pPr>
+            <a:r>
+              <a:rPr lang="en" dirty="0" smtClean="0"/>
+              <a:t>OKC Coffee &amp; Code</a:t>
+            </a:r>
+            <a:endParaRPr dirty="0"/>
+          </a:p>
+        </p:txBody>
+      </p:sp>
+    </p:spTree>
+    <p:extLst>
+      <p:ext uri="{BB962C8B-B14F-4D97-AF65-F5344CB8AC3E}">
+        <p14:creationId xmlns:p14="http://schemas.microsoft.com/office/powerpoint/2010/main" val="1244037922"/>
+      </p:ext>
+    </p:extLst>
+  </p:cSld>
+  <p:clrMapOvr>
+    <a:masterClrMapping/>
+  </p:clrMapOvr>
+  <mc:AlternateContent xmlns:mc="http://schemas.openxmlformats.org/markup-compatibility/2006" xmlns:p14="http://schemas.microsoft.com/office/powerpoint/2010/main">
+    <mc:Choice Requires="p14">
+      <p:transition spd="slow" p14:dur="2000" advTm="10000"/>
+    </mc:Choice>
+    <mc:Fallback xmlns="">
+      <p:transition spd="slow" advTm="10000"/>
+    </mc:Fallback>
+  </mc:AlternateContent>
+</p:sld>
+</file>
+
+<file path=ppt/slides/slide11.xml><?xml version="1.0" encoding="utf-8"?>
 <p:sld xmlns:a="http://schemas.openxmlformats.org/drawingml/2006/main" xmlns:r="http://schemas.openxmlformats.org/officeDocument/2006/relationships" xmlns:p="http://schemas.openxmlformats.org/presentationml/2006/main">
   <p:cSld>
     <p:spTree>
@@ -6916,18 +7179,18 @@
   <p:clrMapOvr>
     <a:masterClrMapping/>
   </p:clrMapOvr>
-  <mc:AlternateContent xmlns:mc="http://schemas.openxmlformats.org/markup-compatibility/2006">
-    <mc:Choice xmlns:p14="http://schemas.microsoft.com/office/powerpoint/2010/main" Requires="p14">
+  <mc:AlternateContent xmlns:mc="http://schemas.openxmlformats.org/markup-compatibility/2006" xmlns:p14="http://schemas.microsoft.com/office/powerpoint/2010/main">
+    <mc:Choice Requires="p14">
       <p:transition spd="slow" p14:dur="2000" advTm="10000"/>
     </mc:Choice>
-    <mc:Fallback>
+    <mc:Fallback xmlns="">
       <p:transition spd="slow" advTm="10000"/>
     </mc:Fallback>
   </mc:AlternateContent>
 </p:sld>
 </file>
 
-<file path=ppt/slides/slide11.xml><?xml version="1.0" encoding="utf-8"?>
+<file path=ppt/slides/slide12.xml><?xml version="1.0" encoding="utf-8"?>
 <p:sld xmlns:a="http://schemas.openxmlformats.org/drawingml/2006/main" xmlns:r="http://schemas.openxmlformats.org/officeDocument/2006/relationships" xmlns:p="http://schemas.openxmlformats.org/presentationml/2006/main">
   <p:cSld>
     <p:spTree>
@@ -6979,18 +7242,18 @@
               <a:buNone/>
             </a:pPr>
             <a:r>
-              <a:rPr lang="en"/>
+              <a:rPr lang="en" dirty="0"/>
               <a:t>Satur</a:t>
             </a:r>
             <a:r>
-              <a:rPr lang="en" sz="4000"/>
+              <a:rPr lang="en" sz="4000" dirty="0"/>
               <a:t>day 1/</a:t>
             </a:r>
             <a:r>
-              <a:rPr lang="en"/>
+              <a:rPr lang="en" dirty="0"/>
               <a:t>27</a:t>
             </a:r>
-            <a:endParaRPr sz="4000"/>
+            <a:endParaRPr sz="4000" dirty="0"/>
           </a:p>
           <a:p>
             <a:pPr marL="0" lvl="0" indent="0" rtl="0">
@@ -7008,10 +7271,10 @@
               <a:buNone/>
             </a:pPr>
             <a:r>
-              <a:rPr lang="en"/>
+              <a:rPr lang="en" dirty="0"/>
               <a:t>2:00 - 4:00 pm</a:t>
             </a:r>
-            <a:endParaRPr sz="4000"/>
+            <a:endParaRPr sz="4000" dirty="0"/>
           </a:p>
           <a:p>
             <a:pPr marL="0" lvl="0" indent="0" rtl="0">
@@ -7029,10 +7292,10 @@
               <a:buNone/>
             </a:pPr>
             <a:r>
-              <a:rPr lang="en"/>
+              <a:rPr lang="en" dirty="0"/>
               <a:t>D3 - Data-Driven Documents</a:t>
             </a:r>
-            <a:endParaRPr sz="4000"/>
+            <a:endParaRPr sz="4000" dirty="0"/>
           </a:p>
           <a:p>
             <a:pPr marL="0" lvl="0" indent="0" rtl="0">
@@ -7045,7 +7308,7 @@
               <a:buNone/>
             </a:pPr>
             <a:r>
-              <a:rPr lang="en" u="sng">
+              <a:rPr lang="en" u="sng" dirty="0">
                 <a:solidFill>
                   <a:schemeClr val="hlink"/>
                 </a:solidFill>
@@ -7054,10 +7317,10 @@
               <a:t>www.meetup.com/code-norman</a:t>
             </a:r>
             <a:r>
-              <a:rPr lang="en"/>
+              <a:rPr lang="en" dirty="0"/>
               <a:t> </a:t>
             </a:r>
-            <a:endParaRPr sz="4000"/>
+            <a:endParaRPr sz="4000" dirty="0"/>
           </a:p>
         </p:txBody>
       </p:sp>
@@ -7108,18 +7371,18 @@
   <p:clrMapOvr>
     <a:masterClrMapping/>
   </p:clrMapOvr>
-  <mc:AlternateContent xmlns:mc="http://schemas.openxmlformats.org/markup-compatibility/2006">
-    <mc:Choice xmlns:p14="http://schemas.microsoft.com/office/powerpoint/2010/main" Requires="p14">
+  <mc:AlternateContent xmlns:mc="http://schemas.openxmlformats.org/markup-compatibility/2006" xmlns:p14="http://schemas.microsoft.com/office/powerpoint/2010/main">
+    <mc:Choice Requires="p14">
       <p:transition spd="slow" p14:dur="2000" advTm="10000"/>
     </mc:Choice>
-    <mc:Fallback>
+    <mc:Fallback xmlns="">
       <p:transition spd="slow" advTm="10000"/>
     </mc:Fallback>
   </mc:AlternateContent>
 </p:sld>
 </file>
 
-<file path=ppt/slides/slide12.xml><?xml version="1.0" encoding="utf-8"?>
+<file path=ppt/slides/slide13.xml><?xml version="1.0" encoding="utf-8"?>
 <p:sld xmlns:a="http://schemas.openxmlformats.org/drawingml/2006/main" xmlns:r="http://schemas.openxmlformats.org/officeDocument/2006/relationships" xmlns:p="http://schemas.openxmlformats.org/presentationml/2006/main">
   <p:cSld>
     <p:spTree>
@@ -7293,25 +7556,7 @@
                 </a:solidFill>
                 <a:hlinkClick r:id="rId3"/>
               </a:rPr>
-              <a:t>www.m</a:t>
-            </a:r>
-            <a:r>
-              <a:rPr lang="en" sz="4000" u="sng">
-                <a:solidFill>
-                  <a:schemeClr val="hlink"/>
-                </a:solidFill>
-                <a:hlinkClick r:id="rId3"/>
-              </a:rPr>
-              <a:t>e</a:t>
-            </a:r>
-            <a:r>
-              <a:rPr lang="en" sz="4000" u="sng">
-                <a:solidFill>
-                  <a:schemeClr val="hlink"/>
-                </a:solidFill>
-                <a:hlinkClick r:id="rId3"/>
-              </a:rPr>
-              <a:t>etup.com/freecodecampokc</a:t>
+              <a:t>www.meetup.com/freecodecampokc</a:t>
             </a:r>
             <a:r>
               <a:rPr lang="en" sz="4000"/>
@@ -7326,18 +7571,18 @@
   <p:clrMapOvr>
     <a:masterClrMapping/>
   </p:clrMapOvr>
-  <mc:AlternateContent xmlns:mc="http://schemas.openxmlformats.org/markup-compatibility/2006">
-    <mc:Choice xmlns:p14="http://schemas.microsoft.com/office/powerpoint/2010/main" Requires="p14">
+  <mc:AlternateContent xmlns:mc="http://schemas.openxmlformats.org/markup-compatibility/2006" xmlns:p14="http://schemas.microsoft.com/office/powerpoint/2010/main">
+    <mc:Choice Requires="p14">
       <p:transition spd="slow" p14:dur="2000" advTm="10000"/>
     </mc:Choice>
-    <mc:Fallback>
+    <mc:Fallback xmlns="">
       <p:transition spd="slow" advTm="10000"/>
     </mc:Fallback>
   </mc:AlternateContent>
 </p:sld>
 </file>
 
-<file path=ppt/slides/slide13.xml><?xml version="1.0" encoding="utf-8"?>
+<file path=ppt/slides/slide14.xml><?xml version="1.0" encoding="utf-8"?>
 <p:sld xmlns:a="http://schemas.openxmlformats.org/drawingml/2006/main" xmlns:r="http://schemas.openxmlformats.org/officeDocument/2006/relationships" xmlns:p="http://schemas.openxmlformats.org/presentationml/2006/main">
   <p:cSld>
     <p:spTree>
@@ -7518,11 +7763,11 @@
   <p:clrMapOvr>
     <a:masterClrMapping/>
   </p:clrMapOvr>
-  <mc:AlternateContent xmlns:mc="http://schemas.openxmlformats.org/markup-compatibility/2006">
-    <mc:Choice xmlns:p14="http://schemas.microsoft.com/office/powerpoint/2010/main" Requires="p14">
+  <mc:AlternateContent xmlns:mc="http://schemas.openxmlformats.org/markup-compatibility/2006" xmlns:p14="http://schemas.microsoft.com/office/powerpoint/2010/main">
+    <mc:Choice Requires="p14">
       <p:transition spd="slow" p14:dur="2000" advTm="10000"/>
     </mc:Choice>
-    <mc:Fallback>
+    <mc:Fallback xmlns="">
       <p:transition spd="slow" advTm="10000"/>
     </mc:Fallback>
   </mc:AlternateContent>
@@ -7715,11 +7960,11 @@
   <p:clrMapOvr>
     <a:masterClrMapping/>
   </p:clrMapOvr>
-  <mc:AlternateContent xmlns:mc="http://schemas.openxmlformats.org/markup-compatibility/2006">
-    <mc:Choice xmlns:p14="http://schemas.microsoft.com/office/powerpoint/2010/main" Requires="p14">
+  <mc:AlternateContent xmlns:mc="http://schemas.openxmlformats.org/markup-compatibility/2006" xmlns:p14="http://schemas.microsoft.com/office/powerpoint/2010/main">
+    <mc:Choice Requires="p14">
       <p:transition spd="slow" p14:dur="2000" advTm="10000"/>
     </mc:Choice>
-    <mc:Fallback>
+    <mc:Fallback xmlns="">
       <p:transition spd="slow" advTm="10000"/>
     </mc:Fallback>
   </mc:AlternateContent>
@@ -7790,11 +8035,11 @@
   <p:clrMapOvr>
     <a:masterClrMapping/>
   </p:clrMapOvr>
-  <mc:AlternateContent xmlns:mc="http://schemas.openxmlformats.org/markup-compatibility/2006">
-    <mc:Choice xmlns:p14="http://schemas.microsoft.com/office/powerpoint/2010/main" Requires="p14">
+  <mc:AlternateContent xmlns:mc="http://schemas.openxmlformats.org/markup-compatibility/2006" xmlns:p14="http://schemas.microsoft.com/office/powerpoint/2010/main">
+    <mc:Choice Requires="p14">
       <p:transition spd="slow" p14:dur="2000" advTm="10000"/>
     </mc:Choice>
-    <mc:Fallback>
+    <mc:Fallback xmlns="">
       <p:transition spd="slow" advTm="10000"/>
     </mc:Fallback>
   </mc:AlternateContent>
@@ -7971,11 +8216,11 @@
   <p:clrMapOvr>
     <a:masterClrMapping/>
   </p:clrMapOvr>
-  <mc:AlternateContent xmlns:mc="http://schemas.openxmlformats.org/markup-compatibility/2006">
-    <mc:Choice xmlns:p14="http://schemas.microsoft.com/office/powerpoint/2010/main" Requires="p14">
+  <mc:AlternateContent xmlns:mc="http://schemas.openxmlformats.org/markup-compatibility/2006" xmlns:p14="http://schemas.microsoft.com/office/powerpoint/2010/main">
+    <mc:Choice Requires="p14">
       <p:transition spd="slow" p14:dur="2000" advTm="10000"/>
     </mc:Choice>
-    <mc:Fallback>
+    <mc:Fallback xmlns="">
       <p:transition spd="slow" advTm="10000"/>
     </mc:Fallback>
   </mc:AlternateContent>
@@ -8147,11 +8392,11 @@
   <p:clrMapOvr>
     <a:masterClrMapping/>
   </p:clrMapOvr>
-  <mc:AlternateContent xmlns:mc="http://schemas.openxmlformats.org/markup-compatibility/2006">
-    <mc:Choice xmlns:p14="http://schemas.microsoft.com/office/powerpoint/2010/main" Requires="p14">
+  <mc:AlternateContent xmlns:mc="http://schemas.openxmlformats.org/markup-compatibility/2006" xmlns:p14="http://schemas.microsoft.com/office/powerpoint/2010/main">
+    <mc:Choice Requires="p14">
       <p:transition spd="slow" p14:dur="2000" advTm="10000"/>
     </mc:Choice>
-    <mc:Fallback>
+    <mc:Fallback xmlns="">
       <p:transition spd="slow" advTm="10000"/>
     </mc:Fallback>
   </mc:AlternateContent>
@@ -8312,11 +8557,11 @@
   <p:clrMapOvr>
     <a:masterClrMapping/>
   </p:clrMapOvr>
-  <mc:AlternateContent xmlns:mc="http://schemas.openxmlformats.org/markup-compatibility/2006">
-    <mc:Choice xmlns:p14="http://schemas.microsoft.com/office/powerpoint/2010/main" Requires="p14">
+  <mc:AlternateContent xmlns:mc="http://schemas.openxmlformats.org/markup-compatibility/2006" xmlns:p14="http://schemas.microsoft.com/office/powerpoint/2010/main">
+    <mc:Choice Requires="p14">
       <p:transition spd="slow" p14:dur="2000" advTm="10000"/>
     </mc:Choice>
-    <mc:Fallback>
+    <mc:Fallback xmlns="">
       <p:transition spd="slow" advTm="10000"/>
     </mc:Fallback>
   </mc:AlternateContent>
@@ -8479,11 +8724,11 @@
   <p:clrMapOvr>
     <a:masterClrMapping/>
   </p:clrMapOvr>
-  <mc:AlternateContent xmlns:mc="http://schemas.openxmlformats.org/markup-compatibility/2006">
-    <mc:Choice xmlns:p14="http://schemas.microsoft.com/office/powerpoint/2010/main" Requires="p14">
+  <mc:AlternateContent xmlns:mc="http://schemas.openxmlformats.org/markup-compatibility/2006" xmlns:p14="http://schemas.microsoft.com/office/powerpoint/2010/main">
+    <mc:Choice Requires="p14">
       <p:transition spd="slow" p14:dur="2000" advTm="10000"/>
     </mc:Choice>
-    <mc:Fallback>
+    <mc:Fallback xmlns="">
       <p:transition spd="slow" advTm="10000"/>
     </mc:Fallback>
   </mc:AlternateContent>
@@ -8628,11 +8873,11 @@
   <p:clrMapOvr>
     <a:masterClrMapping/>
   </p:clrMapOvr>
-  <mc:AlternateContent xmlns:mc="http://schemas.openxmlformats.org/markup-compatibility/2006">
-    <mc:Choice xmlns:p14="http://schemas.microsoft.com/office/powerpoint/2010/main" Requires="p14">
+  <mc:AlternateContent xmlns:mc="http://schemas.openxmlformats.org/markup-compatibility/2006" xmlns:p14="http://schemas.microsoft.com/office/powerpoint/2010/main">
+    <mc:Choice Requires="p14">
       <p:transition spd="slow" p14:dur="2000" advTm="10000"/>
     </mc:Choice>
-    <mc:Fallback>
+    <mc:Fallback xmlns="">
       <p:transition spd="slow" advTm="10000"/>
     </mc:Fallback>
   </mc:AlternateContent>
@@ -8770,11 +9015,11 @@
   <p:clrMapOvr>
     <a:masterClrMapping/>
   </p:clrMapOvr>
-  <mc:AlternateContent xmlns:mc="http://schemas.openxmlformats.org/markup-compatibility/2006">
-    <mc:Choice xmlns:p14="http://schemas.microsoft.com/office/powerpoint/2010/main" Requires="p14">
+  <mc:AlternateContent xmlns:mc="http://schemas.openxmlformats.org/markup-compatibility/2006" xmlns:p14="http://schemas.microsoft.com/office/powerpoint/2010/main">
+    <mc:Choice Requires="p14">
       <p:transition spd="slow" p14:dur="2000" advTm="10000"/>
     </mc:Choice>
-    <mc:Fallback>
+    <mc:Fallback xmlns="">
       <p:transition spd="slow" advTm="10000"/>
     </mc:Fallback>
   </mc:AlternateContent>

</xml_diff>